<commit_message>
Dropped in README framework (from README provide during prework)
</commit_message>
<xml_diff>
--- a/assets/reference/wireframe.pptx
+++ b/assets/reference/wireframe.pptx
@@ -6,6 +6,8 @@
   </p:sldMasterIdLst>
   <p:sldIdLst>
     <p:sldId id="256" r:id="rId2"/>
+    <p:sldId id="257" r:id="rId3"/>
+    <p:sldId id="258" r:id="rId4"/>
   </p:sldIdLst>
   <p:sldSz cx="12192000" cy="6858000"/>
   <p:notesSz cx="6858000" cy="9144000"/>
@@ -104,6 +106,11 @@
       </a:defRPr>
     </a:lvl9pPr>
   </p:defaultTextStyle>
+  <p:extLst>
+    <p:ext uri="{EFAFB233-063F-42B5-8137-9DF3F51BA10A}">
+      <p15:sldGuideLst xmlns:p15="http://schemas.microsoft.com/office/powerpoint/2012/main"/>
+    </p:ext>
+  </p:extLst>
 </p:presentation>
 </file>
 
@@ -3321,10 +3328,801 @@
           <a:chExt cx="0" cy="0"/>
         </a:xfrm>
       </p:grpSpPr>
+      <p:sp>
+        <p:nvSpPr>
+          <p:cNvPr id="3" name="TextBox 2">
+            <a:extLst>
+              <a:ext uri="{FF2B5EF4-FFF2-40B4-BE49-F238E27FC236}">
+                <a16:creationId xmlns:a16="http://schemas.microsoft.com/office/drawing/2014/main" id="{8D9B7F44-4A6F-3974-A618-252F0B06BD68}"/>
+              </a:ext>
+            </a:extLst>
+          </p:cNvPr>
+          <p:cNvSpPr txBox="1"/>
+          <p:nvPr/>
+        </p:nvSpPr>
+        <p:spPr>
+          <a:xfrm>
+            <a:off x="5529532" y="353683"/>
+            <a:ext cx="5495026" cy="369332"/>
+          </a:xfrm>
+          <a:prstGeom prst="rect">
+            <a:avLst/>
+          </a:prstGeom>
+          <a:noFill/>
+        </p:spPr>
+        <p:txBody>
+          <a:bodyPr wrap="square" rtlCol="0">
+            <a:spAutoFit/>
+          </a:bodyPr>
+          <a:lstStyle/>
+          <a:p>
+            <a:r>
+              <a:rPr lang="en-US" dirty="0"/>
+              <a:t>About Us		GitHub Repo</a:t>
+            </a:r>
+          </a:p>
+        </p:txBody>
+      </p:sp>
+      <p:sp>
+        <p:nvSpPr>
+          <p:cNvPr id="4" name="Rectangle 3">
+            <a:extLst>
+              <a:ext uri="{FF2B5EF4-FFF2-40B4-BE49-F238E27FC236}">
+                <a16:creationId xmlns:a16="http://schemas.microsoft.com/office/drawing/2014/main" id="{D7C46C28-8510-D6E2-FAAC-2A1E3F16FBC3}"/>
+              </a:ext>
+            </a:extLst>
+          </p:cNvPr>
+          <p:cNvSpPr/>
+          <p:nvPr/>
+        </p:nvSpPr>
+        <p:spPr>
+          <a:xfrm>
+            <a:off x="9592573" y="236424"/>
+            <a:ext cx="1633268" cy="603849"/>
+          </a:xfrm>
+          <a:prstGeom prst="rect">
+            <a:avLst/>
+          </a:prstGeom>
+        </p:spPr>
+        <p:style>
+          <a:lnRef idx="2">
+            <a:schemeClr val="accent1">
+              <a:shade val="15000"/>
+            </a:schemeClr>
+          </a:lnRef>
+          <a:fillRef idx="1">
+            <a:schemeClr val="accent1"/>
+          </a:fillRef>
+          <a:effectRef idx="0">
+            <a:schemeClr val="accent1"/>
+          </a:effectRef>
+          <a:fontRef idx="minor">
+            <a:schemeClr val="lt1"/>
+          </a:fontRef>
+        </p:style>
+        <p:txBody>
+          <a:bodyPr rtlCol="0" anchor="ctr"/>
+          <a:lstStyle/>
+          <a:p>
+            <a:pPr algn="ctr"/>
+            <a:r>
+              <a:rPr lang="en-US" dirty="0"/>
+              <a:t>Play Now</a:t>
+            </a:r>
+          </a:p>
+        </p:txBody>
+      </p:sp>
+      <p:pic>
+        <p:nvPicPr>
+          <p:cNvPr id="6" name="Picture 5" descr="Blank road sign">
+            <a:extLst>
+              <a:ext uri="{FF2B5EF4-FFF2-40B4-BE49-F238E27FC236}">
+                <a16:creationId xmlns:a16="http://schemas.microsoft.com/office/drawing/2014/main" id="{E94A4D29-346D-F38B-BE09-1C5284BC6E42}"/>
+              </a:ext>
+            </a:extLst>
+          </p:cNvPr>
+          <p:cNvPicPr>
+            <a:picLocks noChangeAspect="1"/>
+          </p:cNvPicPr>
+          <p:nvPr/>
+        </p:nvPicPr>
+        <p:blipFill>
+          <a:blip r:embed="rId2">
+            <a:extLst>
+              <a:ext uri="{28A0092B-C50C-407E-A947-70E740481C1C}">
+                <a14:useLocalDpi xmlns:a14="http://schemas.microsoft.com/office/drawing/2010/main" val="0"/>
+              </a:ext>
+            </a:extLst>
+          </a:blip>
+          <a:stretch>
+            <a:fillRect/>
+          </a:stretch>
+        </p:blipFill>
+        <p:spPr>
+          <a:xfrm>
+            <a:off x="594375" y="75457"/>
+            <a:ext cx="2553086" cy="1701609"/>
+          </a:xfrm>
+          <a:prstGeom prst="rect">
+            <a:avLst/>
+          </a:prstGeom>
+        </p:spPr>
+      </p:pic>
+      <p:sp>
+        <p:nvSpPr>
+          <p:cNvPr id="7" name="TextBox 6">
+            <a:extLst>
+              <a:ext uri="{FF2B5EF4-FFF2-40B4-BE49-F238E27FC236}">
+                <a16:creationId xmlns:a16="http://schemas.microsoft.com/office/drawing/2014/main" id="{C7290DFF-41D6-5095-42A5-E839068DBAC4}"/>
+              </a:ext>
+            </a:extLst>
+          </p:cNvPr>
+          <p:cNvSpPr txBox="1"/>
+          <p:nvPr/>
+        </p:nvSpPr>
+        <p:spPr>
+          <a:xfrm>
+            <a:off x="3436219" y="2136808"/>
+            <a:ext cx="5765533" cy="3970318"/>
+          </a:xfrm>
+          <a:prstGeom prst="rect">
+            <a:avLst/>
+          </a:prstGeom>
+          <a:noFill/>
+        </p:spPr>
+        <p:txBody>
+          <a:bodyPr wrap="square" rtlCol="0">
+            <a:spAutoFit/>
+          </a:bodyPr>
+          <a:lstStyle/>
+          <a:p>
+            <a:r>
+              <a:rPr lang="en-US" dirty="0"/>
+              <a:t>Ipsum lorem…..</a:t>
+            </a:r>
+          </a:p>
+          <a:p>
+            <a:r>
+              <a:rPr lang="en-US" dirty="0"/>
+              <a:t>….</a:t>
+            </a:r>
+          </a:p>
+          <a:p>
+            <a:r>
+              <a:rPr lang="en-US" dirty="0"/>
+              <a:t>…..</a:t>
+            </a:r>
+          </a:p>
+          <a:p>
+            <a:r>
+              <a:rPr lang="en-US" dirty="0"/>
+              <a:t>…….</a:t>
+            </a:r>
+          </a:p>
+          <a:p>
+            <a:r>
+              <a:rPr lang="en-US" dirty="0"/>
+              <a:t>…………</a:t>
+            </a:r>
+          </a:p>
+          <a:p>
+            <a:r>
+              <a:rPr lang="en-US" dirty="0"/>
+              <a:t>……………</a:t>
+            </a:r>
+          </a:p>
+          <a:p>
+            <a:r>
+              <a:rPr lang="en-US" dirty="0"/>
+              <a:t>………………..</a:t>
+            </a:r>
+          </a:p>
+          <a:p>
+            <a:r>
+              <a:rPr lang="en-US" dirty="0"/>
+              <a:t>……………………….</a:t>
+            </a:r>
+          </a:p>
+          <a:p>
+            <a:r>
+              <a:rPr lang="en-US" dirty="0"/>
+              <a:t>………………………………</a:t>
+            </a:r>
+          </a:p>
+          <a:p>
+            <a:r>
+              <a:rPr lang="en-US" dirty="0"/>
+              <a:t>………………………………………..</a:t>
+            </a:r>
+          </a:p>
+          <a:p>
+            <a:r>
+              <a:rPr lang="en-US" dirty="0"/>
+              <a:t>How to Play the Game</a:t>
+            </a:r>
+          </a:p>
+          <a:p>
+            <a:endParaRPr lang="en-US" dirty="0"/>
+          </a:p>
+          <a:p>
+            <a:endParaRPr lang="en-US" dirty="0"/>
+          </a:p>
+          <a:p>
+            <a:endParaRPr lang="en-US" dirty="0"/>
+          </a:p>
+        </p:txBody>
+      </p:sp>
+      <p:sp>
+        <p:nvSpPr>
+          <p:cNvPr id="8" name="Rectangle: Rounded Corners 7">
+            <a:extLst>
+              <a:ext uri="{FF2B5EF4-FFF2-40B4-BE49-F238E27FC236}">
+                <a16:creationId xmlns:a16="http://schemas.microsoft.com/office/drawing/2014/main" id="{CA6B1972-348A-3425-7E8C-52273A62F180}"/>
+              </a:ext>
+            </a:extLst>
+          </p:cNvPr>
+          <p:cNvSpPr/>
+          <p:nvPr/>
+        </p:nvSpPr>
+        <p:spPr>
+          <a:xfrm>
+            <a:off x="8989996" y="1777066"/>
+            <a:ext cx="2607629" cy="4623734"/>
+          </a:xfrm>
+          <a:prstGeom prst="roundRect">
+            <a:avLst/>
+          </a:prstGeom>
+        </p:spPr>
+        <p:style>
+          <a:lnRef idx="2">
+            <a:schemeClr val="accent3">
+              <a:shade val="15000"/>
+            </a:schemeClr>
+          </a:lnRef>
+          <a:fillRef idx="1">
+            <a:schemeClr val="accent3"/>
+          </a:fillRef>
+          <a:effectRef idx="0">
+            <a:schemeClr val="accent3"/>
+          </a:effectRef>
+          <a:fontRef idx="minor">
+            <a:schemeClr val="lt1"/>
+          </a:fontRef>
+        </p:style>
+        <p:txBody>
+          <a:bodyPr rtlCol="0" anchor="ctr"/>
+          <a:lstStyle/>
+          <a:p>
+            <a:pPr algn="ctr"/>
+            <a:endParaRPr lang="en-US"/>
+          </a:p>
+        </p:txBody>
+      </p:sp>
     </p:spTree>
     <p:extLst>
       <p:ext uri="{BB962C8B-B14F-4D97-AF65-F5344CB8AC3E}">
         <p14:creationId xmlns:p14="http://schemas.microsoft.com/office/powerpoint/2010/main" val="4228542224"/>
+      </p:ext>
+    </p:extLst>
+  </p:cSld>
+  <p:clrMapOvr>
+    <a:masterClrMapping/>
+  </p:clrMapOvr>
+</p:sld>
+</file>
+
+<file path=ppt/slides/slide2.xml><?xml version="1.0" encoding="utf-8"?>
+<p:sld xmlns:a="http://schemas.openxmlformats.org/drawingml/2006/main" xmlns:r="http://schemas.openxmlformats.org/officeDocument/2006/relationships" xmlns:p="http://schemas.openxmlformats.org/presentationml/2006/main">
+  <p:cSld>
+    <p:spTree>
+      <p:nvGrpSpPr>
+        <p:cNvPr id="1" name=""/>
+        <p:cNvGrpSpPr/>
+        <p:nvPr/>
+      </p:nvGrpSpPr>
+      <p:grpSpPr>
+        <a:xfrm>
+          <a:off x="0" y="0"/>
+          <a:ext cx="0" cy="0"/>
+          <a:chOff x="0" y="0"/>
+          <a:chExt cx="0" cy="0"/>
+        </a:xfrm>
+      </p:grpSpPr>
+      <p:sp>
+        <p:nvSpPr>
+          <p:cNvPr id="2" name="Rectangle: Rounded Corners 1">
+            <a:extLst>
+              <a:ext uri="{FF2B5EF4-FFF2-40B4-BE49-F238E27FC236}">
+                <a16:creationId xmlns:a16="http://schemas.microsoft.com/office/drawing/2014/main" id="{F7E0013D-72C3-F60B-3A8A-6E601F2BA631}"/>
+              </a:ext>
+            </a:extLst>
+          </p:cNvPr>
+          <p:cNvSpPr/>
+          <p:nvPr/>
+        </p:nvSpPr>
+        <p:spPr>
+          <a:xfrm>
+            <a:off x="388189" y="1138687"/>
+            <a:ext cx="1733909" cy="508958"/>
+          </a:xfrm>
+          <a:prstGeom prst="roundRect">
+            <a:avLst/>
+          </a:prstGeom>
+        </p:spPr>
+        <p:style>
+          <a:lnRef idx="2">
+            <a:schemeClr val="accent1">
+              <a:shade val="15000"/>
+            </a:schemeClr>
+          </a:lnRef>
+          <a:fillRef idx="1">
+            <a:schemeClr val="accent1"/>
+          </a:fillRef>
+          <a:effectRef idx="0">
+            <a:schemeClr val="accent1"/>
+          </a:effectRef>
+          <a:fontRef idx="minor">
+            <a:schemeClr val="lt1"/>
+          </a:fontRef>
+        </p:style>
+        <p:txBody>
+          <a:bodyPr rtlCol="0" anchor="ctr"/>
+          <a:lstStyle/>
+          <a:p>
+            <a:pPr algn="ctr"/>
+            <a:r>
+              <a:rPr lang="en-US" dirty="0"/>
+              <a:t>Play</a:t>
+            </a:r>
+          </a:p>
+        </p:txBody>
+      </p:sp>
+      <p:sp>
+        <p:nvSpPr>
+          <p:cNvPr id="3" name="Rectangle: Rounded Corners 2">
+            <a:extLst>
+              <a:ext uri="{FF2B5EF4-FFF2-40B4-BE49-F238E27FC236}">
+                <a16:creationId xmlns:a16="http://schemas.microsoft.com/office/drawing/2014/main" id="{86791F22-A3CA-8E25-DC6F-AA540AE0264C}"/>
+              </a:ext>
+            </a:extLst>
+          </p:cNvPr>
+          <p:cNvSpPr/>
+          <p:nvPr/>
+        </p:nvSpPr>
+        <p:spPr>
+          <a:xfrm>
+            <a:off x="388188" y="5788324"/>
+            <a:ext cx="1733909" cy="508958"/>
+          </a:xfrm>
+          <a:prstGeom prst="roundRect">
+            <a:avLst/>
+          </a:prstGeom>
+        </p:spPr>
+        <p:style>
+          <a:lnRef idx="2">
+            <a:schemeClr val="accent1">
+              <a:shade val="15000"/>
+            </a:schemeClr>
+          </a:lnRef>
+          <a:fillRef idx="1">
+            <a:schemeClr val="accent1"/>
+          </a:fillRef>
+          <a:effectRef idx="0">
+            <a:schemeClr val="accent1"/>
+          </a:effectRef>
+          <a:fontRef idx="minor">
+            <a:schemeClr val="lt1"/>
+          </a:fontRef>
+        </p:style>
+        <p:txBody>
+          <a:bodyPr rtlCol="0" anchor="ctr"/>
+          <a:lstStyle/>
+          <a:p>
+            <a:pPr algn="ctr"/>
+            <a:r>
+              <a:rPr lang="en-US" dirty="0"/>
+              <a:t>Reset</a:t>
+            </a:r>
+          </a:p>
+        </p:txBody>
+      </p:sp>
+      <p:pic>
+        <p:nvPicPr>
+          <p:cNvPr id="1026" name="Picture 2" descr="Connect 4 | Figma">
+            <a:extLst>
+              <a:ext uri="{FF2B5EF4-FFF2-40B4-BE49-F238E27FC236}">
+                <a16:creationId xmlns:a16="http://schemas.microsoft.com/office/drawing/2014/main" id="{FDE3C074-CDA9-A345-2CEC-C2D7D5D0C8F6}"/>
+              </a:ext>
+            </a:extLst>
+          </p:cNvPr>
+          <p:cNvPicPr>
+            <a:picLocks noChangeAspect="1" noChangeArrowheads="1"/>
+          </p:cNvPicPr>
+          <p:nvPr/>
+        </p:nvPicPr>
+        <p:blipFill>
+          <a:blip r:embed="rId2">
+            <a:extLst>
+              <a:ext uri="{28A0092B-C50C-407E-A947-70E740481C1C}">
+                <a14:useLocalDpi xmlns:a14="http://schemas.microsoft.com/office/drawing/2010/main" val="0"/>
+              </a:ext>
+            </a:extLst>
+          </a:blip>
+          <a:srcRect/>
+          <a:stretch>
+            <a:fillRect/>
+          </a:stretch>
+        </p:blipFill>
+        <p:spPr bwMode="auto">
+          <a:xfrm>
+            <a:off x="2874109" y="780772"/>
+            <a:ext cx="6658080" cy="5449584"/>
+          </a:xfrm>
+          <a:prstGeom prst="rect">
+            <a:avLst/>
+          </a:prstGeom>
+          <a:noFill/>
+          <a:extLst>
+            <a:ext uri="{909E8E84-426E-40DD-AFC4-6F175D3DCCD1}">
+              <a14:hiddenFill xmlns:a14="http://schemas.microsoft.com/office/drawing/2010/main">
+                <a:solidFill>
+                  <a:srgbClr val="FFFFFF"/>
+                </a:solidFill>
+              </a14:hiddenFill>
+            </a:ext>
+          </a:extLst>
+        </p:spPr>
+      </p:pic>
+      <p:sp>
+        <p:nvSpPr>
+          <p:cNvPr id="4" name="Rectangle 3">
+            <a:extLst>
+              <a:ext uri="{FF2B5EF4-FFF2-40B4-BE49-F238E27FC236}">
+                <a16:creationId xmlns:a16="http://schemas.microsoft.com/office/drawing/2014/main" id="{7D6DC6E7-04B3-BB80-B759-EEE930E8539E}"/>
+              </a:ext>
+            </a:extLst>
+          </p:cNvPr>
+          <p:cNvSpPr/>
+          <p:nvPr/>
+        </p:nvSpPr>
+        <p:spPr>
+          <a:xfrm>
+            <a:off x="3252158" y="0"/>
+            <a:ext cx="5883216" cy="780772"/>
+          </a:xfrm>
+          <a:prstGeom prst="rect">
+            <a:avLst/>
+          </a:prstGeom>
+          <a:noFill/>
+          <a:ln>
+            <a:prstDash val="sysDot"/>
+          </a:ln>
+        </p:spPr>
+        <p:style>
+          <a:lnRef idx="2">
+            <a:schemeClr val="accent1">
+              <a:shade val="15000"/>
+            </a:schemeClr>
+          </a:lnRef>
+          <a:fillRef idx="1">
+            <a:schemeClr val="accent1"/>
+          </a:fillRef>
+          <a:effectRef idx="0">
+            <a:schemeClr val="accent1"/>
+          </a:effectRef>
+          <a:fontRef idx="minor">
+            <a:schemeClr val="lt1"/>
+          </a:fontRef>
+        </p:style>
+        <p:txBody>
+          <a:bodyPr rtlCol="0" anchor="ctr"/>
+          <a:lstStyle/>
+          <a:p>
+            <a:pPr algn="ctr"/>
+            <a:endParaRPr lang="en-US"/>
+          </a:p>
+        </p:txBody>
+      </p:sp>
+    </p:spTree>
+    <p:extLst>
+      <p:ext uri="{BB962C8B-B14F-4D97-AF65-F5344CB8AC3E}">
+        <p14:creationId xmlns:p14="http://schemas.microsoft.com/office/powerpoint/2010/main" val="725284295"/>
+      </p:ext>
+    </p:extLst>
+  </p:cSld>
+  <p:clrMapOvr>
+    <a:masterClrMapping/>
+  </p:clrMapOvr>
+</p:sld>
+</file>
+
+<file path=ppt/slides/slide3.xml><?xml version="1.0" encoding="utf-8"?>
+<p:sld xmlns:a="http://schemas.openxmlformats.org/drawingml/2006/main" xmlns:r="http://schemas.openxmlformats.org/officeDocument/2006/relationships" xmlns:p="http://schemas.openxmlformats.org/presentationml/2006/main">
+  <p:cSld>
+    <p:spTree>
+      <p:nvGrpSpPr>
+        <p:cNvPr id="1" name=""/>
+        <p:cNvGrpSpPr/>
+        <p:nvPr/>
+      </p:nvGrpSpPr>
+      <p:grpSpPr>
+        <a:xfrm>
+          <a:off x="0" y="0"/>
+          <a:ext cx="0" cy="0"/>
+          <a:chOff x="0" y="0"/>
+          <a:chExt cx="0" cy="0"/>
+        </a:xfrm>
+      </p:grpSpPr>
+      <p:sp>
+        <p:nvSpPr>
+          <p:cNvPr id="4" name="Rectangle 3">
+            <a:extLst>
+              <a:ext uri="{FF2B5EF4-FFF2-40B4-BE49-F238E27FC236}">
+                <a16:creationId xmlns:a16="http://schemas.microsoft.com/office/drawing/2014/main" id="{8370CCF5-4248-CE7B-3D7A-3B82AEE2E484}"/>
+              </a:ext>
+            </a:extLst>
+          </p:cNvPr>
+          <p:cNvSpPr/>
+          <p:nvPr/>
+        </p:nvSpPr>
+        <p:spPr>
+          <a:xfrm>
+            <a:off x="0" y="0"/>
+            <a:ext cx="12192000" cy="1224951"/>
+          </a:xfrm>
+          <a:prstGeom prst="rect">
+            <a:avLst/>
+          </a:prstGeom>
+        </p:spPr>
+        <p:style>
+          <a:lnRef idx="2">
+            <a:schemeClr val="accent1">
+              <a:shade val="15000"/>
+            </a:schemeClr>
+          </a:lnRef>
+          <a:fillRef idx="1">
+            <a:schemeClr val="accent1"/>
+          </a:fillRef>
+          <a:effectRef idx="0">
+            <a:schemeClr val="accent1"/>
+          </a:effectRef>
+          <a:fontRef idx="minor">
+            <a:schemeClr val="lt1"/>
+          </a:fontRef>
+        </p:style>
+        <p:txBody>
+          <a:bodyPr rtlCol="0" anchor="ctr"/>
+          <a:lstStyle/>
+          <a:p>
+            <a:pPr algn="ctr"/>
+            <a:endParaRPr lang="en-US"/>
+          </a:p>
+        </p:txBody>
+      </p:sp>
+      <p:pic>
+        <p:nvPicPr>
+          <p:cNvPr id="6" name="Graphic 5" descr="Male profile with solid fill">
+            <a:extLst>
+              <a:ext uri="{FF2B5EF4-FFF2-40B4-BE49-F238E27FC236}">
+                <a16:creationId xmlns:a16="http://schemas.microsoft.com/office/drawing/2014/main" id="{57A14442-DD50-7814-DEC3-FB29028F3B25}"/>
+              </a:ext>
+            </a:extLst>
+          </p:cNvPr>
+          <p:cNvPicPr>
+            <a:picLocks noChangeAspect="1"/>
+          </p:cNvPicPr>
+          <p:nvPr/>
+        </p:nvPicPr>
+        <p:blipFill>
+          <a:blip r:embed="rId2">
+            <a:extLst>
+              <a:ext uri="{96DAC541-7B7A-43D3-8B79-37D633B846F1}">
+                <asvg:svgBlip xmlns:asvg="http://schemas.microsoft.com/office/drawing/2016/SVG/main" r:embed="rId3"/>
+              </a:ext>
+            </a:extLst>
+          </a:blip>
+          <a:stretch>
+            <a:fillRect/>
+          </a:stretch>
+        </p:blipFill>
+        <p:spPr>
+          <a:xfrm>
+            <a:off x="2851020" y="1574317"/>
+            <a:ext cx="1279585" cy="1279585"/>
+          </a:xfrm>
+          <a:prstGeom prst="rect">
+            <a:avLst/>
+          </a:prstGeom>
+        </p:spPr>
+      </p:pic>
+      <p:pic>
+        <p:nvPicPr>
+          <p:cNvPr id="7" name="Graphic 6" descr="Male profile with solid fill">
+            <a:extLst>
+              <a:ext uri="{FF2B5EF4-FFF2-40B4-BE49-F238E27FC236}">
+                <a16:creationId xmlns:a16="http://schemas.microsoft.com/office/drawing/2014/main" id="{62F8E6FE-3C06-37E5-2EA9-9FEC8F74600D}"/>
+              </a:ext>
+            </a:extLst>
+          </p:cNvPr>
+          <p:cNvPicPr>
+            <a:picLocks noChangeAspect="1"/>
+          </p:cNvPicPr>
+          <p:nvPr/>
+        </p:nvPicPr>
+        <p:blipFill>
+          <a:blip r:embed="rId2">
+            <a:extLst>
+              <a:ext uri="{96DAC541-7B7A-43D3-8B79-37D633B846F1}">
+                <asvg:svgBlip xmlns:asvg="http://schemas.microsoft.com/office/drawing/2016/SVG/main" r:embed="rId3"/>
+              </a:ext>
+            </a:extLst>
+          </a:blip>
+          <a:stretch>
+            <a:fillRect/>
+          </a:stretch>
+        </p:blipFill>
+        <p:spPr>
+          <a:xfrm>
+            <a:off x="4812098" y="1574318"/>
+            <a:ext cx="1279585" cy="1279585"/>
+          </a:xfrm>
+          <a:prstGeom prst="rect">
+            <a:avLst/>
+          </a:prstGeom>
+        </p:spPr>
+      </p:pic>
+      <p:pic>
+        <p:nvPicPr>
+          <p:cNvPr id="8" name="Graphic 7" descr="Male profile with solid fill">
+            <a:extLst>
+              <a:ext uri="{FF2B5EF4-FFF2-40B4-BE49-F238E27FC236}">
+                <a16:creationId xmlns:a16="http://schemas.microsoft.com/office/drawing/2014/main" id="{7D105942-C80C-1690-2726-88C1D2862752}"/>
+              </a:ext>
+            </a:extLst>
+          </p:cNvPr>
+          <p:cNvPicPr>
+            <a:picLocks noChangeAspect="1"/>
+          </p:cNvPicPr>
+          <p:nvPr/>
+        </p:nvPicPr>
+        <p:blipFill>
+          <a:blip r:embed="rId2">
+            <a:extLst>
+              <a:ext uri="{96DAC541-7B7A-43D3-8B79-37D633B846F1}">
+                <asvg:svgBlip xmlns:asvg="http://schemas.microsoft.com/office/drawing/2016/SVG/main" r:embed="rId3"/>
+              </a:ext>
+            </a:extLst>
+          </a:blip>
+          <a:stretch>
+            <a:fillRect/>
+          </a:stretch>
+        </p:blipFill>
+        <p:spPr>
+          <a:xfrm>
+            <a:off x="6773176" y="1574318"/>
+            <a:ext cx="1279585" cy="1279585"/>
+          </a:xfrm>
+          <a:prstGeom prst="rect">
+            <a:avLst/>
+          </a:prstGeom>
+        </p:spPr>
+      </p:pic>
+      <p:pic>
+        <p:nvPicPr>
+          <p:cNvPr id="9" name="Graphic 8" descr="Male profile with solid fill">
+            <a:extLst>
+              <a:ext uri="{FF2B5EF4-FFF2-40B4-BE49-F238E27FC236}">
+                <a16:creationId xmlns:a16="http://schemas.microsoft.com/office/drawing/2014/main" id="{7F21ACEB-5AD2-DBC5-8EE9-95EFD5CC9C24}"/>
+              </a:ext>
+            </a:extLst>
+          </p:cNvPr>
+          <p:cNvPicPr>
+            <a:picLocks noChangeAspect="1"/>
+          </p:cNvPicPr>
+          <p:nvPr/>
+        </p:nvPicPr>
+        <p:blipFill>
+          <a:blip r:embed="rId2">
+            <a:extLst>
+              <a:ext uri="{96DAC541-7B7A-43D3-8B79-37D633B846F1}">
+                <asvg:svgBlip xmlns:asvg="http://schemas.microsoft.com/office/drawing/2016/SVG/main" r:embed="rId3"/>
+              </a:ext>
+            </a:extLst>
+          </a:blip>
+          <a:stretch>
+            <a:fillRect/>
+          </a:stretch>
+        </p:blipFill>
+        <p:spPr>
+          <a:xfrm>
+            <a:off x="8734254" y="1574318"/>
+            <a:ext cx="1279585" cy="1279585"/>
+          </a:xfrm>
+          <a:prstGeom prst="rect">
+            <a:avLst/>
+          </a:prstGeom>
+        </p:spPr>
+      </p:pic>
+      <p:sp>
+        <p:nvSpPr>
+          <p:cNvPr id="10" name="TextBox 9">
+            <a:extLst>
+              <a:ext uri="{FF2B5EF4-FFF2-40B4-BE49-F238E27FC236}">
+                <a16:creationId xmlns:a16="http://schemas.microsoft.com/office/drawing/2014/main" id="{06226453-2C85-2AC1-A77C-704B9D95A712}"/>
+              </a:ext>
+            </a:extLst>
+          </p:cNvPr>
+          <p:cNvSpPr txBox="1"/>
+          <p:nvPr/>
+        </p:nvSpPr>
+        <p:spPr>
+          <a:xfrm>
+            <a:off x="2851020" y="2976113"/>
+            <a:ext cx="6931335" cy="3693319"/>
+          </a:xfrm>
+          <a:prstGeom prst="rect">
+            <a:avLst/>
+          </a:prstGeom>
+          <a:noFill/>
+          <a:ln w="9525">
+            <a:solidFill>
+              <a:schemeClr val="tx1"/>
+            </a:solidFill>
+          </a:ln>
+        </p:spPr>
+        <p:txBody>
+          <a:bodyPr wrap="square" rtlCol="0">
+            <a:spAutoFit/>
+          </a:bodyPr>
+          <a:lstStyle/>
+          <a:p>
+            <a:r>
+              <a:rPr lang="en-US" dirty="0"/>
+              <a:t>Team Bios</a:t>
+            </a:r>
+          </a:p>
+          <a:p>
+            <a:endParaRPr lang="en-US" dirty="0"/>
+          </a:p>
+          <a:p>
+            <a:endParaRPr lang="en-US" dirty="0"/>
+          </a:p>
+          <a:p>
+            <a:endParaRPr lang="en-US" dirty="0"/>
+          </a:p>
+          <a:p>
+            <a:endParaRPr lang="en-US" dirty="0"/>
+          </a:p>
+          <a:p>
+            <a:endParaRPr lang="en-US" dirty="0"/>
+          </a:p>
+          <a:p>
+            <a:endParaRPr lang="en-US" dirty="0"/>
+          </a:p>
+          <a:p>
+            <a:endParaRPr lang="en-US" dirty="0"/>
+          </a:p>
+          <a:p>
+            <a:endParaRPr lang="en-US" dirty="0"/>
+          </a:p>
+          <a:p>
+            <a:endParaRPr lang="en-US" dirty="0"/>
+          </a:p>
+          <a:p>
+            <a:endParaRPr lang="en-US" dirty="0"/>
+          </a:p>
+          <a:p>
+            <a:endParaRPr lang="en-US" dirty="0"/>
+          </a:p>
+          <a:p>
+            <a:endParaRPr lang="en-US" dirty="0"/>
+          </a:p>
+        </p:txBody>
+      </p:sp>
+    </p:spTree>
+    <p:extLst>
+      <p:ext uri="{BB962C8B-B14F-4D97-AF65-F5344CB8AC3E}">
+        <p14:creationId xmlns:p14="http://schemas.microsoft.com/office/powerpoint/2010/main" val="2515772911"/>
       </p:ext>
     </p:extLst>
   </p:cSld>

</xml_diff>

<commit_message>
Added logic for gameplay
</commit_message>
<xml_diff>
--- a/assets/reference/wireframe.pptx
+++ b/assets/reference/wireframe.pptx
@@ -3820,6 +3820,150 @@
           <a:p>
             <a:pPr algn="ctr"/>
             <a:endParaRPr lang="en-US"/>
+          </a:p>
+        </p:txBody>
+      </p:sp>
+      <p:cxnSp>
+        <p:nvCxnSpPr>
+          <p:cNvPr id="6" name="Straight Arrow Connector 5">
+            <a:extLst>
+              <a:ext uri="{FF2B5EF4-FFF2-40B4-BE49-F238E27FC236}">
+                <a16:creationId xmlns:a16="http://schemas.microsoft.com/office/drawing/2014/main" id="{97B75E76-9D2D-1135-CEEA-C11F30A01AB9}"/>
+              </a:ext>
+            </a:extLst>
+          </p:cNvPr>
+          <p:cNvCxnSpPr/>
+          <p:nvPr/>
+        </p:nvCxnSpPr>
+        <p:spPr>
+          <a:xfrm>
+            <a:off x="3326004" y="6481187"/>
+            <a:ext cx="7275007" cy="0"/>
+          </a:xfrm>
+          <a:prstGeom prst="straightConnector1">
+            <a:avLst/>
+          </a:prstGeom>
+          <a:ln>
+            <a:tailEnd type="triangle"/>
+          </a:ln>
+        </p:spPr>
+        <p:style>
+          <a:lnRef idx="2">
+            <a:schemeClr val="accent1"/>
+          </a:lnRef>
+          <a:fillRef idx="0">
+            <a:schemeClr val="accent1"/>
+          </a:fillRef>
+          <a:effectRef idx="1">
+            <a:schemeClr val="accent1"/>
+          </a:effectRef>
+          <a:fontRef idx="minor">
+            <a:schemeClr val="tx1"/>
+          </a:fontRef>
+        </p:style>
+      </p:cxnSp>
+      <p:sp>
+        <p:nvSpPr>
+          <p:cNvPr id="7" name="TextBox 6">
+            <a:extLst>
+              <a:ext uri="{FF2B5EF4-FFF2-40B4-BE49-F238E27FC236}">
+                <a16:creationId xmlns:a16="http://schemas.microsoft.com/office/drawing/2014/main" id="{13AD4A35-AF97-27C4-553B-37F20D4D8810}"/>
+              </a:ext>
+            </a:extLst>
+          </p:cNvPr>
+          <p:cNvSpPr txBox="1"/>
+          <p:nvPr/>
+        </p:nvSpPr>
+        <p:spPr>
+          <a:xfrm>
+            <a:off x="10671349" y="6158021"/>
+            <a:ext cx="1386672" cy="646331"/>
+          </a:xfrm>
+          <a:prstGeom prst="rect">
+            <a:avLst/>
+          </a:prstGeom>
+          <a:noFill/>
+        </p:spPr>
+        <p:txBody>
+          <a:bodyPr wrap="square" rtlCol="0">
+            <a:spAutoFit/>
+          </a:bodyPr>
+          <a:lstStyle/>
+          <a:p>
+            <a:r>
+              <a:rPr lang="en-US" dirty="0"/>
+              <a:t>X Axis (first dimension)</a:t>
+            </a:r>
+          </a:p>
+        </p:txBody>
+      </p:sp>
+      <p:sp>
+        <p:nvSpPr>
+          <p:cNvPr id="8" name="TextBox 7">
+            <a:extLst>
+              <a:ext uri="{FF2B5EF4-FFF2-40B4-BE49-F238E27FC236}">
+                <a16:creationId xmlns:a16="http://schemas.microsoft.com/office/drawing/2014/main" id="{CEC4DA8E-0AC5-6FD6-8C63-04C83B37BDB6}"/>
+              </a:ext>
+            </a:extLst>
+          </p:cNvPr>
+          <p:cNvSpPr txBox="1"/>
+          <p:nvPr/>
+        </p:nvSpPr>
+        <p:spPr>
+          <a:xfrm>
+            <a:off x="3516922" y="5074418"/>
+            <a:ext cx="823966" cy="369332"/>
+          </a:xfrm>
+          <a:prstGeom prst="rect">
+            <a:avLst/>
+          </a:prstGeom>
+          <a:noFill/>
+        </p:spPr>
+        <p:txBody>
+          <a:bodyPr wrap="square" rtlCol="0">
+            <a:spAutoFit/>
+          </a:bodyPr>
+          <a:lstStyle/>
+          <a:p>
+            <a:r>
+              <a:rPr lang="en-US" dirty="0"/>
+              <a:t>[0][0]</a:t>
+            </a:r>
+          </a:p>
+        </p:txBody>
+      </p:sp>
+      <p:sp>
+        <p:nvSpPr>
+          <p:cNvPr id="9" name="TextBox 8">
+            <a:extLst>
+              <a:ext uri="{FF2B5EF4-FFF2-40B4-BE49-F238E27FC236}">
+                <a16:creationId xmlns:a16="http://schemas.microsoft.com/office/drawing/2014/main" id="{EB815474-9DE2-45D2-9EDB-1F7961C26072}"/>
+              </a:ext>
+            </a:extLst>
+          </p:cNvPr>
+          <p:cNvSpPr txBox="1"/>
+          <p:nvPr/>
+        </p:nvSpPr>
+        <p:spPr>
+          <a:xfrm>
+            <a:off x="8159260" y="1192212"/>
+            <a:ext cx="823966" cy="369332"/>
+          </a:xfrm>
+          <a:prstGeom prst="rect">
+            <a:avLst/>
+          </a:prstGeom>
+          <a:noFill/>
+        </p:spPr>
+        <p:txBody>
+          <a:bodyPr wrap="square" rtlCol="0">
+            <a:spAutoFit/>
+          </a:bodyPr>
+          <a:lstStyle/>
+          <a:p>
+            <a:r>
+              <a:rPr lang="en-US" dirty="0"/>
+              <a:t>[6][5]</a:t>
+            </a:r>
           </a:p>
         </p:txBody>
       </p:sp>

</xml_diff>